<commit_message>
Presentaiotn ENG, poster last red
</commit_message>
<xml_diff>
--- a/Poster.pptx
+++ b/Poster.pptx
@@ -5579,7 +5579,7 @@
               </a:r>
               <a:r>
                 <a:rPr lang="en-US" sz="2400" dirty="0"/>
-                <a:t>EPLTASMLAAAPPQEQK      SMLA      prefix         4653.40152</a:t>
+                <a:t>EPLTASMLAASMLA      prefix         4653.40152</a:t>
               </a:r>
             </a:p>
             <a:p>
@@ -12052,10 +12052,10 @@
         </p:nvGrpSpPr>
         <p:grpSpPr>
           <a:xfrm>
-            <a:off x="8556615" y="13768039"/>
-            <a:ext cx="5740649" cy="2518328"/>
-            <a:chOff x="8092027" y="13844255"/>
-            <a:chExt cx="5740649" cy="2518328"/>
+            <a:off x="8556614" y="13768042"/>
+            <a:ext cx="5740650" cy="2472125"/>
+            <a:chOff x="8092026" y="13844258"/>
+            <a:chExt cx="5740650" cy="2472125"/>
           </a:xfrm>
         </p:grpSpPr>
         <p:grpSp>
@@ -12072,10 +12072,10 @@
           </p:nvGrpSpPr>
           <p:grpSpPr>
             <a:xfrm>
-              <a:off x="8092027" y="13844255"/>
-              <a:ext cx="4415394" cy="2518328"/>
+              <a:off x="8092026" y="13844258"/>
+              <a:ext cx="4415392" cy="2472125"/>
               <a:chOff x="18854872" y="12415809"/>
-              <a:chExt cx="4764337" cy="2514104"/>
+              <a:chExt cx="4764335" cy="2467978"/>
             </a:xfrm>
           </p:grpSpPr>
           <p:pic>
@@ -12128,7 +12128,7 @@
             </p:nvSpPr>
             <p:spPr>
               <a:xfrm>
-                <a:off x="20468506" y="14469023"/>
+                <a:off x="20468504" y="14422897"/>
                 <a:ext cx="3150703" cy="460890"/>
               </a:xfrm>
               <a:prstGeom prst="rect">
@@ -14062,8 +14062,8 @@
           </a:fontRef>
         </p:style>
       </p:cxnSp>
-      <mc:AlternateContent xmlns:mc="http://schemas.openxmlformats.org/markup-compatibility/2006">
-        <mc:Choice xmlns:a14="http://schemas.microsoft.com/office/drawing/2010/main" Requires="a14">
+      <mc:AlternateContent xmlns:mc="http://schemas.openxmlformats.org/markup-compatibility/2006" xmlns:a14="http://schemas.microsoft.com/office/drawing/2010/main">
+        <mc:Choice Requires="a14">
           <p:graphicFrame>
             <p:nvGraphicFramePr>
               <p:cNvPr id="266" name="Table 265">
@@ -14449,7 +14449,7 @@
             </a:graphic>
           </p:graphicFrame>
         </mc:Choice>
-        <mc:Fallback>
+        <mc:Fallback xmlns="">
           <p:graphicFrame>
             <p:nvGraphicFramePr>
               <p:cNvPr id="266" name="Table 265">
@@ -16511,8 +16511,12 @@
               <a:lstStyle/>
               <a:p>
                 <a:r>
+                  <a:rPr lang="ru-RU" sz="2800" dirty="0"/>
+                  <a:t>5</a:t>
+                </a:r>
+                <a:r>
                   <a:rPr lang="en-US" sz="2800" dirty="0"/>
-                  <a:t>6. Information about substitutions</a:t>
+                  <a:t>. Information about substitutions</a:t>
                 </a:r>
               </a:p>
             </p:txBody>
@@ -16743,8 +16747,8 @@
           </a:p>
         </p:txBody>
       </p:sp>
-      <mc:AlternateContent xmlns:mc="http://schemas.openxmlformats.org/markup-compatibility/2006">
-        <mc:Choice xmlns:a14="http://schemas.microsoft.com/office/drawing/2010/main" Requires="a14">
+      <mc:AlternateContent xmlns:mc="http://schemas.openxmlformats.org/markup-compatibility/2006" xmlns:a14="http://schemas.microsoft.com/office/drawing/2010/main">
+        <mc:Choice Requires="a14">
           <p:sp>
             <p:nvSpPr>
               <p:cNvPr id="22" name="TextBox 21">
@@ -16837,7 +16841,7 @@
             </p:txBody>
           </p:sp>
         </mc:Choice>
-        <mc:Fallback>
+        <mc:Fallback xmlns="">
           <p:sp>
             <p:nvSpPr>
               <p:cNvPr id="22" name="TextBox 21">

</xml_diff>